<commit_message>
small presentation update - added final links
</commit_message>
<xml_diff>
--- a/interoperability/Transfer of Research Assets between FAIRDOM SEEKs/Transfer_assets_between_FAIRDOM_SEEKS.pptx
+++ b/interoperability/Transfer of Research Assets between FAIRDOM SEEKs/Transfer_assets_between_FAIRDOM_SEEKS.pptx
@@ -120,6 +120,22 @@
       </a:defRPr>
     </a:lvl9pPr>
   </p:defaultTextStyle>
+  <p:extLst>
+    <p:ext uri="{EFAFB233-063F-42B5-8137-9DF3F51BA10A}">
+      <p15:sldGuideLst xmlns:p15="http://schemas.microsoft.com/office/powerpoint/2012/main">
+        <p15:guide id="1" orient="horz" pos="2160">
+          <p15:clr>
+            <a:srgbClr val="A4A3A4"/>
+          </p15:clr>
+        </p15:guide>
+        <p15:guide id="2" pos="2880">
+          <p15:clr>
+            <a:srgbClr val="A4A3A4"/>
+          </p15:clr>
+        </p15:guide>
+      </p15:sldGuideLst>
+    </p:ext>
+  </p:extLst>
 </p:presentation>
 </file>
 
@@ -205,7 +221,7 @@
           <a:p>
             <a:fld id="{C24CE932-E947-4E58-A7B8-B51AD899B1ED}" type="datetimeFigureOut">
               <a:rPr lang="en-GB" smtClean="0"/>
-              <a:t>08/11/2018</a:t>
+              <a:t>09/11/2018</a:t>
             </a:fld>
             <a:endParaRPr lang="en-GB"/>
           </a:p>
@@ -3187,7 +3203,7 @@
           <a:p>
             <a:fld id="{B9479DA8-CE2C-4983-A222-61725396A781}" type="datetimeFigureOut">
               <a:rPr lang="en-GB" smtClean="0"/>
-              <a:t>08/11/2018</a:t>
+              <a:t>09/11/2018</a:t>
             </a:fld>
             <a:endParaRPr lang="en-GB"/>
           </a:p>
@@ -3327,7 +3343,7 @@
           <a:p>
             <a:fld id="{B9479DA8-CE2C-4983-A222-61725396A781}" type="datetimeFigureOut">
               <a:rPr lang="en-GB" smtClean="0"/>
-              <a:t>08/11/2018</a:t>
+              <a:t>09/11/2018</a:t>
             </a:fld>
             <a:endParaRPr lang="en-GB"/>
           </a:p>
@@ -4737,14 +4753,10 @@
             </a:r>
             <a:r>
               <a:rPr lang="en-GB" b="1" dirty="0"/>
-              <a:t>Assets between </a:t>
-            </a:r>
-            <a:r>
-              <a:rPr lang="en-GB" b="1"/>
-              <a:t>FAIRDOM </a:t>
-            </a:r>
-            <a:r>
-              <a:rPr lang="en-GB" b="1" smtClean="0"/>
+              <a:t>Assets between FAIRDOM </a:t>
+            </a:r>
+            <a:r>
+              <a:rPr lang="en-GB" b="1" dirty="0" smtClean="0"/>
               <a:t>SEEKs</a:t>
             </a:r>
             <a:r>
@@ -7573,8 +7585,15 @@
             </a:r>
             <a:r>
               <a:rPr lang="en-GB" dirty="0" smtClean="0"/>
-              <a:t>: &lt;TBD&gt;</a:t>
-            </a:r>
+              <a:t>: </a:t>
+            </a:r>
+            <a:r>
+              <a:rPr lang="en-GB" dirty="0">
+                <a:hlinkClick r:id="rId9"/>
+              </a:rPr>
+              <a:t>https://github.com/seek4science/biohack-seek</a:t>
+            </a:r>
+            <a:endParaRPr lang="en-GB" dirty="0" smtClean="0"/>
           </a:p>
           <a:p>
             <a:r>
@@ -7583,7 +7602,13 @@
             </a:r>
             <a:r>
               <a:rPr lang="en-GB" dirty="0" smtClean="0"/>
-              <a:t>Docker Hub: &lt;TBD&gt;</a:t>
+              <a:t>Docker Hub: </a:t>
+            </a:r>
+            <a:r>
+              <a:rPr lang="en-GB" dirty="0">
+                <a:hlinkClick r:id="rId9"/>
+              </a:rPr>
+              <a:t>https://hub.docker.com/r/fairdom/biohack-seek/</a:t>
             </a:r>
             <a:endParaRPr lang="en-GB" dirty="0"/>
           </a:p>

</xml_diff>